<commit_message>
add YQLConnector class / UML update
</commit_message>
<xml_diff>
--- a/EC910GroupProject/Model/UML.pptx
+++ b/EC910GroupProject/Model/UML.pptx
@@ -288,7 +288,7 @@
           <a:p>
             <a:fld id="{1379CE38-DE0F-0843-BE6F-9C326E4C062F}" type="datetimeFigureOut">
               <a:rPr lang="de-DE" smtClean="0"/>
-              <a:t>01/12/15</a:t>
+              <a:t>07/12/15</a:t>
             </a:fld>
             <a:endParaRPr lang="de-DE"/>
           </a:p>
@@ -458,7 +458,7 @@
           <a:p>
             <a:fld id="{1379CE38-DE0F-0843-BE6F-9C326E4C062F}" type="datetimeFigureOut">
               <a:rPr lang="de-DE" smtClean="0"/>
-              <a:t>01/12/15</a:t>
+              <a:t>07/12/15</a:t>
             </a:fld>
             <a:endParaRPr lang="de-DE"/>
           </a:p>
@@ -638,7 +638,7 @@
           <a:p>
             <a:fld id="{1379CE38-DE0F-0843-BE6F-9C326E4C062F}" type="datetimeFigureOut">
               <a:rPr lang="de-DE" smtClean="0"/>
-              <a:t>01/12/15</a:t>
+              <a:t>07/12/15</a:t>
             </a:fld>
             <a:endParaRPr lang="de-DE"/>
           </a:p>
@@ -808,7 +808,7 @@
           <a:p>
             <a:fld id="{1379CE38-DE0F-0843-BE6F-9C326E4C062F}" type="datetimeFigureOut">
               <a:rPr lang="de-DE" smtClean="0"/>
-              <a:t>01/12/15</a:t>
+              <a:t>07/12/15</a:t>
             </a:fld>
             <a:endParaRPr lang="de-DE"/>
           </a:p>
@@ -1054,7 +1054,7 @@
           <a:p>
             <a:fld id="{1379CE38-DE0F-0843-BE6F-9C326E4C062F}" type="datetimeFigureOut">
               <a:rPr lang="de-DE" smtClean="0"/>
-              <a:t>01/12/15</a:t>
+              <a:t>07/12/15</a:t>
             </a:fld>
             <a:endParaRPr lang="de-DE"/>
           </a:p>
@@ -1342,7 +1342,7 @@
           <a:p>
             <a:fld id="{1379CE38-DE0F-0843-BE6F-9C326E4C062F}" type="datetimeFigureOut">
               <a:rPr lang="de-DE" smtClean="0"/>
-              <a:t>01/12/15</a:t>
+              <a:t>07/12/15</a:t>
             </a:fld>
             <a:endParaRPr lang="de-DE"/>
           </a:p>
@@ -1769,7 +1769,7 @@
           <a:p>
             <a:fld id="{1379CE38-DE0F-0843-BE6F-9C326E4C062F}" type="datetimeFigureOut">
               <a:rPr lang="de-DE" smtClean="0"/>
-              <a:t>01/12/15</a:t>
+              <a:t>07/12/15</a:t>
             </a:fld>
             <a:endParaRPr lang="de-DE"/>
           </a:p>
@@ -1887,7 +1887,7 @@
           <a:p>
             <a:fld id="{1379CE38-DE0F-0843-BE6F-9C326E4C062F}" type="datetimeFigureOut">
               <a:rPr lang="de-DE" smtClean="0"/>
-              <a:t>01/12/15</a:t>
+              <a:t>07/12/15</a:t>
             </a:fld>
             <a:endParaRPr lang="de-DE"/>
           </a:p>
@@ -1982,7 +1982,7 @@
           <a:p>
             <a:fld id="{1379CE38-DE0F-0843-BE6F-9C326E4C062F}" type="datetimeFigureOut">
               <a:rPr lang="de-DE" smtClean="0"/>
-              <a:t>01/12/15</a:t>
+              <a:t>07/12/15</a:t>
             </a:fld>
             <a:endParaRPr lang="de-DE"/>
           </a:p>
@@ -2259,7 +2259,7 @@
           <a:p>
             <a:fld id="{1379CE38-DE0F-0843-BE6F-9C326E4C062F}" type="datetimeFigureOut">
               <a:rPr lang="de-DE" smtClean="0"/>
-              <a:t>01/12/15</a:t>
+              <a:t>07/12/15</a:t>
             </a:fld>
             <a:endParaRPr lang="de-DE"/>
           </a:p>
@@ -2512,7 +2512,7 @@
           <a:p>
             <a:fld id="{1379CE38-DE0F-0843-BE6F-9C326E4C062F}" type="datetimeFigureOut">
               <a:rPr lang="de-DE" smtClean="0"/>
-              <a:t>01/12/15</a:t>
+              <a:t>07/12/15</a:t>
             </a:fld>
             <a:endParaRPr lang="de-DE"/>
           </a:p>
@@ -2725,7 +2725,7 @@
           <a:p>
             <a:fld id="{1379CE38-DE0F-0843-BE6F-9C326E4C062F}" type="datetimeFigureOut">
               <a:rPr lang="de-DE" smtClean="0"/>
-              <a:t>01/12/15</a:t>
+              <a:t>07/12/15</a:t>
             </a:fld>
             <a:endParaRPr lang="de-DE"/>
           </a:p>
@@ -3102,7 +3102,7 @@
       </p:grpSpPr>
       <p:grpSp>
         <p:nvGrpSpPr>
-          <p:cNvPr id="4" name="Gruppierung 3"/>
+          <p:cNvPr id="109" name="Gruppierung 108"/>
           <p:cNvGrpSpPr/>
           <p:nvPr/>
         </p:nvGrpSpPr>
@@ -3122,7 +3122,7 @@
         </p:grpSpPr>
         <p:grpSp>
           <p:nvGrpSpPr>
-            <p:cNvPr id="5" name="Gruppierung 4"/>
+            <p:cNvPr id="110" name="Gruppierung 109"/>
             <p:cNvGrpSpPr/>
             <p:nvPr/>
           </p:nvGrpSpPr>
@@ -3137,7 +3137,7 @@
           </p:grpSpPr>
           <p:grpSp>
             <p:nvGrpSpPr>
-              <p:cNvPr id="10" name="Gruppierung 9"/>
+              <p:cNvPr id="117" name="Gruppierung 116"/>
               <p:cNvGrpSpPr/>
               <p:nvPr/>
             </p:nvGrpSpPr>
@@ -3152,7 +3152,7 @@
             </p:grpSpPr>
             <p:sp>
               <p:nvSpPr>
-                <p:cNvPr id="13" name="Rechteck 12"/>
+                <p:cNvPr id="126" name="Rechteck 125"/>
                 <p:cNvSpPr/>
                 <p:nvPr/>
               </p:nvSpPr>
@@ -3197,7 +3197,7 @@
             </p:sp>
             <p:sp>
               <p:nvSpPr>
-                <p:cNvPr id="14" name="Rechteck 13"/>
+                <p:cNvPr id="130" name="Rechteck 129"/>
                 <p:cNvSpPr/>
                 <p:nvPr/>
               </p:nvSpPr>
@@ -3243,7 +3243,7 @@
           </p:grpSp>
           <p:sp>
             <p:nvSpPr>
-              <p:cNvPr id="11" name="Textfeld 10"/>
+              <p:cNvPr id="125" name="Textfeld 124"/>
               <p:cNvSpPr txBox="1"/>
               <p:nvPr/>
             </p:nvSpPr>
@@ -3273,7 +3273,7 @@
         </p:grpSp>
         <p:sp>
           <p:nvSpPr>
-            <p:cNvPr id="6" name="Textfeld 5"/>
+            <p:cNvPr id="114" name="Textfeld 113"/>
             <p:cNvSpPr txBox="1"/>
             <p:nvPr/>
           </p:nvSpPr>
@@ -3320,7 +3320,7 @@
       </p:grpSp>
       <p:grpSp>
         <p:nvGrpSpPr>
-          <p:cNvPr id="44" name="Gruppierung 43"/>
+          <p:cNvPr id="144" name="Gruppierung 143"/>
           <p:cNvGrpSpPr/>
           <p:nvPr/>
         </p:nvGrpSpPr>
@@ -3340,7 +3340,7 @@
         </p:grpSpPr>
         <p:grpSp>
           <p:nvGrpSpPr>
-            <p:cNvPr id="45" name="Gruppierung 44"/>
+            <p:cNvPr id="158" name="Gruppierung 157"/>
             <p:cNvGrpSpPr/>
             <p:nvPr/>
           </p:nvGrpSpPr>
@@ -3355,7 +3355,7 @@
           </p:grpSpPr>
           <p:grpSp>
             <p:nvGrpSpPr>
-              <p:cNvPr id="50" name="Gruppierung 49"/>
+              <p:cNvPr id="170" name="Gruppierung 169"/>
               <p:cNvGrpSpPr/>
               <p:nvPr/>
             </p:nvGrpSpPr>
@@ -3370,7 +3370,7 @@
             </p:grpSpPr>
             <p:sp>
               <p:nvSpPr>
-                <p:cNvPr id="53" name="Rechteck 52"/>
+                <p:cNvPr id="182" name="Rechteck 181"/>
                 <p:cNvSpPr/>
                 <p:nvPr/>
               </p:nvSpPr>
@@ -3415,7 +3415,7 @@
             </p:sp>
             <p:sp>
               <p:nvSpPr>
-                <p:cNvPr id="54" name="Rechteck 53"/>
+                <p:cNvPr id="183" name="Rechteck 182"/>
                 <p:cNvSpPr/>
                 <p:nvPr/>
               </p:nvSpPr>
@@ -3461,7 +3461,7 @@
           </p:grpSp>
           <p:sp>
             <p:nvSpPr>
-              <p:cNvPr id="51" name="Textfeld 50"/>
+              <p:cNvPr id="171" name="Textfeld 170"/>
               <p:cNvSpPr txBox="1"/>
               <p:nvPr/>
             </p:nvSpPr>
@@ -3494,7 +3494,7 @@
           </p:sp>
           <p:sp>
             <p:nvSpPr>
-              <p:cNvPr id="52" name="Textfeld 51"/>
+              <p:cNvPr id="181" name="Textfeld 180"/>
               <p:cNvSpPr txBox="1"/>
               <p:nvPr/>
             </p:nvSpPr>
@@ -3560,7 +3560,7 @@
         </p:grpSp>
         <p:sp>
           <p:nvSpPr>
-            <p:cNvPr id="46" name="Textfeld 45"/>
+            <p:cNvPr id="166" name="Textfeld 165"/>
             <p:cNvSpPr txBox="1"/>
             <p:nvPr/>
           </p:nvSpPr>
@@ -3645,7 +3645,7 @@
         </p:sp>
         <p:sp>
           <p:nvSpPr>
-            <p:cNvPr id="48" name="Rechteck 47"/>
+            <p:cNvPr id="168" name="Rechteck 167"/>
             <p:cNvSpPr/>
             <p:nvPr/>
           </p:nvSpPr>
@@ -3691,7 +3691,7 @@
       </p:grpSp>
       <p:grpSp>
         <p:nvGrpSpPr>
-          <p:cNvPr id="55" name="Gruppierung 54"/>
+          <p:cNvPr id="184" name="Gruppierung 183"/>
           <p:cNvGrpSpPr/>
           <p:nvPr/>
         </p:nvGrpSpPr>
@@ -3711,7 +3711,7 @@
         </p:grpSpPr>
         <p:grpSp>
           <p:nvGrpSpPr>
-            <p:cNvPr id="56" name="Gruppierung 55"/>
+            <p:cNvPr id="185" name="Gruppierung 184"/>
             <p:cNvGrpSpPr/>
             <p:nvPr/>
           </p:nvGrpSpPr>
@@ -3726,7 +3726,7 @@
           </p:grpSpPr>
           <p:grpSp>
             <p:nvGrpSpPr>
-              <p:cNvPr id="61" name="Gruppierung 60"/>
+              <p:cNvPr id="188" name="Gruppierung 187"/>
               <p:cNvGrpSpPr/>
               <p:nvPr/>
             </p:nvGrpSpPr>
@@ -3741,7 +3741,7 @@
             </p:grpSpPr>
             <p:sp>
               <p:nvSpPr>
-                <p:cNvPr id="64" name="Rechteck 63"/>
+                <p:cNvPr id="191" name="Rechteck 190"/>
                 <p:cNvSpPr/>
                 <p:nvPr/>
               </p:nvSpPr>
@@ -3786,7 +3786,7 @@
             </p:sp>
             <p:sp>
               <p:nvSpPr>
-                <p:cNvPr id="65" name="Rechteck 64"/>
+                <p:cNvPr id="192" name="Rechteck 191"/>
                 <p:cNvSpPr/>
                 <p:nvPr/>
               </p:nvSpPr>
@@ -3832,7 +3832,7 @@
           </p:grpSp>
           <p:sp>
             <p:nvSpPr>
-              <p:cNvPr id="62" name="Textfeld 61"/>
+              <p:cNvPr id="189" name="Textfeld 188"/>
               <p:cNvSpPr txBox="1"/>
               <p:nvPr/>
             </p:nvSpPr>
@@ -3861,7 +3861,7 @@
           </p:sp>
           <p:sp>
             <p:nvSpPr>
-              <p:cNvPr id="63" name="Textfeld 62"/>
+              <p:cNvPr id="190" name="Textfeld 189"/>
               <p:cNvSpPr txBox="1"/>
               <p:nvPr/>
             </p:nvSpPr>
@@ -3913,7 +3913,7 @@
         </p:grpSp>
         <p:sp>
           <p:nvSpPr>
-            <p:cNvPr id="57" name="Textfeld 56"/>
+            <p:cNvPr id="186" name="Textfeld 185"/>
             <p:cNvSpPr txBox="1"/>
             <p:nvPr/>
           </p:nvSpPr>
@@ -3948,7 +3948,7 @@
         </p:sp>
         <p:sp>
           <p:nvSpPr>
-            <p:cNvPr id="60" name="Rechteck 59"/>
+            <p:cNvPr id="187" name="Rechteck 186"/>
             <p:cNvSpPr/>
             <p:nvPr/>
           </p:nvSpPr>
@@ -3994,7 +3994,7 @@
       </p:grpSp>
       <p:sp>
         <p:nvSpPr>
-          <p:cNvPr id="80" name="Textfeld 79"/>
+          <p:cNvPr id="193" name="Textfeld 192"/>
           <p:cNvSpPr txBox="1"/>
           <p:nvPr/>
         </p:nvSpPr>
@@ -4020,7 +4020,7 @@
       </p:sp>
       <p:sp>
         <p:nvSpPr>
-          <p:cNvPr id="81" name="Textfeld 80"/>
+          <p:cNvPr id="194" name="Textfeld 193"/>
           <p:cNvSpPr txBox="1"/>
           <p:nvPr/>
         </p:nvSpPr>
@@ -4046,13 +4046,13 @@
       </p:sp>
       <p:grpSp>
         <p:nvGrpSpPr>
-          <p:cNvPr id="83" name="Gruppierung 82"/>
+          <p:cNvPr id="195" name="Gruppierung 194"/>
           <p:cNvGrpSpPr/>
           <p:nvPr/>
         </p:nvGrpSpPr>
         <p:grpSpPr>
           <a:xfrm>
-            <a:off x="36845549" y="8593211"/>
+            <a:off x="37000685" y="12434270"/>
             <a:ext cx="5625275" cy="4626952"/>
             <a:chOff x="1175283" y="407242"/>
             <a:chExt cx="2018837" cy="2303261"/>
@@ -4066,7 +4066,7 @@
         </p:grpSpPr>
         <p:grpSp>
           <p:nvGrpSpPr>
-            <p:cNvPr id="84" name="Gruppierung 83"/>
+            <p:cNvPr id="196" name="Gruppierung 195"/>
             <p:cNvGrpSpPr/>
             <p:nvPr/>
           </p:nvGrpSpPr>
@@ -4081,7 +4081,7 @@
           </p:grpSpPr>
           <p:grpSp>
             <p:nvGrpSpPr>
-              <p:cNvPr id="89" name="Gruppierung 88"/>
+              <p:cNvPr id="198" name="Gruppierung 197"/>
               <p:cNvGrpSpPr/>
               <p:nvPr/>
             </p:nvGrpSpPr>
@@ -4096,7 +4096,7 @@
             </p:grpSpPr>
             <p:sp>
               <p:nvSpPr>
-                <p:cNvPr id="92" name="Rechteck 91"/>
+                <p:cNvPr id="201" name="Rechteck 200"/>
                 <p:cNvSpPr/>
                 <p:nvPr/>
               </p:nvSpPr>
@@ -4141,7 +4141,7 @@
             </p:sp>
             <p:sp>
               <p:nvSpPr>
-                <p:cNvPr id="93" name="Rechteck 92"/>
+                <p:cNvPr id="202" name="Rechteck 201"/>
                 <p:cNvSpPr/>
                 <p:nvPr/>
               </p:nvSpPr>
@@ -4187,7 +4187,7 @@
           </p:grpSp>
           <p:sp>
             <p:nvSpPr>
-              <p:cNvPr id="90" name="Textfeld 89"/>
+              <p:cNvPr id="199" name="Textfeld 198"/>
               <p:cNvSpPr txBox="1"/>
               <p:nvPr/>
             </p:nvSpPr>
@@ -4217,7 +4217,7 @@
           </p:sp>
           <p:sp>
             <p:nvSpPr>
-              <p:cNvPr id="91" name="Textfeld 90"/>
+              <p:cNvPr id="200" name="Textfeld 199"/>
               <p:cNvSpPr txBox="1"/>
               <p:nvPr/>
             </p:nvSpPr>
@@ -4292,7 +4292,7 @@
         </p:grpSp>
         <p:sp>
           <p:nvSpPr>
-            <p:cNvPr id="85" name="Textfeld 84"/>
+            <p:cNvPr id="197" name="Textfeld 196"/>
             <p:cNvSpPr txBox="1"/>
             <p:nvPr/>
           </p:nvSpPr>
@@ -4337,7 +4337,7 @@
       </p:grpSp>
       <p:grpSp>
         <p:nvGrpSpPr>
-          <p:cNvPr id="95" name="Gruppierung 94"/>
+          <p:cNvPr id="203" name="Gruppierung 202"/>
           <p:cNvGrpSpPr/>
           <p:nvPr/>
         </p:nvGrpSpPr>
@@ -4357,7 +4357,7 @@
         </p:grpSpPr>
         <p:grpSp>
           <p:nvGrpSpPr>
-            <p:cNvPr id="96" name="Gruppierung 95"/>
+            <p:cNvPr id="204" name="Gruppierung 203"/>
             <p:cNvGrpSpPr/>
             <p:nvPr/>
           </p:nvGrpSpPr>
@@ -4372,7 +4372,7 @@
           </p:grpSpPr>
           <p:grpSp>
             <p:nvGrpSpPr>
-              <p:cNvPr id="101" name="Gruppierung 100"/>
+              <p:cNvPr id="206" name="Gruppierung 205"/>
               <p:cNvGrpSpPr/>
               <p:nvPr/>
             </p:nvGrpSpPr>
@@ -4387,7 +4387,7 @@
             </p:grpSpPr>
             <p:sp>
               <p:nvSpPr>
-                <p:cNvPr id="104" name="Rechteck 103"/>
+                <p:cNvPr id="209" name="Rechteck 208"/>
                 <p:cNvSpPr/>
                 <p:nvPr/>
               </p:nvSpPr>
@@ -4432,7 +4432,7 @@
             </p:sp>
             <p:sp>
               <p:nvSpPr>
-                <p:cNvPr id="105" name="Rechteck 104"/>
+                <p:cNvPr id="210" name="Rechteck 209"/>
                 <p:cNvSpPr/>
                 <p:nvPr/>
               </p:nvSpPr>
@@ -4478,7 +4478,7 @@
           </p:grpSp>
           <p:sp>
             <p:nvSpPr>
-              <p:cNvPr id="102" name="Textfeld 101"/>
+              <p:cNvPr id="207" name="Textfeld 206"/>
               <p:cNvSpPr txBox="1"/>
               <p:nvPr/>
             </p:nvSpPr>
@@ -4515,7 +4515,7 @@
           </p:sp>
           <p:sp>
             <p:nvSpPr>
-              <p:cNvPr id="103" name="Textfeld 102"/>
+              <p:cNvPr id="208" name="Textfeld 207"/>
               <p:cNvSpPr txBox="1"/>
               <p:nvPr/>
             </p:nvSpPr>
@@ -4594,7 +4594,7 @@
         </p:grpSp>
         <p:sp>
           <p:nvSpPr>
-            <p:cNvPr id="97" name="Textfeld 96"/>
+            <p:cNvPr id="205" name="Textfeld 204"/>
             <p:cNvSpPr txBox="1"/>
             <p:nvPr/>
           </p:nvSpPr>
@@ -4651,7 +4651,7 @@
       </p:grpSp>
       <p:grpSp>
         <p:nvGrpSpPr>
-          <p:cNvPr id="119" name="Gruppierung 118"/>
+          <p:cNvPr id="211" name="Gruppierung 210"/>
           <p:cNvGrpSpPr/>
           <p:nvPr/>
         </p:nvGrpSpPr>
@@ -4671,7 +4671,7 @@
         </p:grpSpPr>
         <p:grpSp>
           <p:nvGrpSpPr>
-            <p:cNvPr id="106" name="Gruppierung 105"/>
+            <p:cNvPr id="212" name="Gruppierung 211"/>
             <p:cNvGrpSpPr/>
             <p:nvPr/>
           </p:nvGrpSpPr>
@@ -4686,7 +4686,7 @@
           </p:grpSpPr>
           <p:grpSp>
             <p:nvGrpSpPr>
-              <p:cNvPr id="107" name="Gruppierung 106"/>
+              <p:cNvPr id="214" name="Gruppierung 213"/>
               <p:cNvGrpSpPr/>
               <p:nvPr/>
             </p:nvGrpSpPr>
@@ -4701,7 +4701,7 @@
             </p:grpSpPr>
             <p:grpSp>
               <p:nvGrpSpPr>
-                <p:cNvPr id="112" name="Gruppierung 111"/>
+                <p:cNvPr id="217" name="Gruppierung 216"/>
                 <p:cNvGrpSpPr/>
                 <p:nvPr/>
               </p:nvGrpSpPr>
@@ -4716,7 +4716,7 @@
               </p:grpSpPr>
               <p:sp>
                 <p:nvSpPr>
-                  <p:cNvPr id="115" name="Rechteck 114"/>
+                  <p:cNvPr id="219" name="Rechteck 218"/>
                   <p:cNvSpPr/>
                   <p:nvPr/>
                 </p:nvSpPr>
@@ -4761,7 +4761,7 @@
               </p:sp>
               <p:sp>
                 <p:nvSpPr>
-                  <p:cNvPr id="116" name="Rechteck 115"/>
+                  <p:cNvPr id="220" name="Rechteck 219"/>
                   <p:cNvSpPr/>
                   <p:nvPr/>
                 </p:nvSpPr>
@@ -4807,7 +4807,7 @@
             </p:grpSp>
             <p:sp>
               <p:nvSpPr>
-                <p:cNvPr id="113" name="Textfeld 112"/>
+                <p:cNvPr id="218" name="Textfeld 217"/>
                 <p:cNvSpPr txBox="1"/>
                 <p:nvPr/>
               </p:nvSpPr>
@@ -4837,7 +4837,7 @@
           </p:grpSp>
           <p:sp>
             <p:nvSpPr>
-              <p:cNvPr id="108" name="Textfeld 107"/>
+              <p:cNvPr id="215" name="Textfeld 214"/>
               <p:cNvSpPr txBox="1"/>
               <p:nvPr/>
             </p:nvSpPr>
@@ -4888,7 +4888,7 @@
           </p:sp>
           <p:sp>
             <p:nvSpPr>
-              <p:cNvPr id="111" name="Rechteck 110"/>
+              <p:cNvPr id="216" name="Rechteck 215"/>
               <p:cNvSpPr/>
               <p:nvPr/>
             </p:nvSpPr>
@@ -4934,7 +4934,7 @@
         </p:grpSp>
         <p:sp>
           <p:nvSpPr>
-            <p:cNvPr id="118" name="Textfeld 117"/>
+            <p:cNvPr id="213" name="Textfeld 212"/>
             <p:cNvSpPr txBox="1"/>
             <p:nvPr/>
           </p:nvSpPr>
@@ -4991,7 +4991,7 @@
       </p:grpSp>
       <p:grpSp>
         <p:nvGrpSpPr>
-          <p:cNvPr id="120" name="Gruppierung 119"/>
+          <p:cNvPr id="221" name="Gruppierung 220"/>
           <p:cNvGrpSpPr/>
           <p:nvPr/>
         </p:nvGrpSpPr>
@@ -5011,7 +5011,7 @@
         </p:grpSpPr>
         <p:grpSp>
           <p:nvGrpSpPr>
-            <p:cNvPr id="121" name="Gruppierung 120"/>
+            <p:cNvPr id="222" name="Gruppierung 221"/>
             <p:cNvGrpSpPr/>
             <p:nvPr/>
           </p:nvGrpSpPr>
@@ -5026,7 +5026,7 @@
           </p:grpSpPr>
           <p:grpSp>
             <p:nvGrpSpPr>
-              <p:cNvPr id="123" name="Gruppierung 122"/>
+              <p:cNvPr id="224" name="Gruppierung 223"/>
               <p:cNvGrpSpPr/>
               <p:nvPr/>
             </p:nvGrpSpPr>
@@ -5041,7 +5041,7 @@
             </p:grpSpPr>
             <p:grpSp>
               <p:nvGrpSpPr>
-                <p:cNvPr id="128" name="Gruppierung 127"/>
+                <p:cNvPr id="227" name="Gruppierung 226"/>
                 <p:cNvGrpSpPr/>
                 <p:nvPr/>
               </p:nvGrpSpPr>
@@ -5056,7 +5056,7 @@
               </p:grpSpPr>
               <p:sp>
                 <p:nvSpPr>
-                  <p:cNvPr id="131" name="Rechteck 130"/>
+                  <p:cNvPr id="229" name="Rechteck 228"/>
                   <p:cNvSpPr/>
                   <p:nvPr/>
                 </p:nvSpPr>
@@ -5101,7 +5101,7 @@
               </p:sp>
               <p:sp>
                 <p:nvSpPr>
-                  <p:cNvPr id="132" name="Rechteck 131"/>
+                  <p:cNvPr id="230" name="Rechteck 229"/>
                   <p:cNvSpPr/>
                   <p:nvPr/>
                 </p:nvSpPr>
@@ -5147,7 +5147,7 @@
             </p:grpSp>
             <p:sp>
               <p:nvSpPr>
-                <p:cNvPr id="129" name="Textfeld 128"/>
+                <p:cNvPr id="228" name="Textfeld 227"/>
                 <p:cNvSpPr txBox="1"/>
                 <p:nvPr/>
               </p:nvSpPr>
@@ -5177,7 +5177,7 @@
           </p:grpSp>
           <p:sp>
             <p:nvSpPr>
-              <p:cNvPr id="124" name="Textfeld 123"/>
+              <p:cNvPr id="225" name="Textfeld 224"/>
               <p:cNvSpPr txBox="1"/>
               <p:nvPr/>
             </p:nvSpPr>
@@ -5227,7 +5227,7 @@
           </p:sp>
           <p:sp>
             <p:nvSpPr>
-              <p:cNvPr id="127" name="Rechteck 126"/>
+              <p:cNvPr id="226" name="Rechteck 225"/>
               <p:cNvSpPr/>
               <p:nvPr/>
             </p:nvSpPr>
@@ -5273,7 +5273,7 @@
         </p:grpSp>
         <p:sp>
           <p:nvSpPr>
-            <p:cNvPr id="122" name="Textfeld 121"/>
+            <p:cNvPr id="223" name="Textfeld 222"/>
             <p:cNvSpPr txBox="1"/>
             <p:nvPr/>
           </p:nvSpPr>
@@ -5355,7 +5355,7 @@
       </p:grpSp>
       <p:grpSp>
         <p:nvGrpSpPr>
-          <p:cNvPr id="133" name="Gruppierung 132"/>
+          <p:cNvPr id="231" name="Gruppierung 230"/>
           <p:cNvGrpSpPr/>
           <p:nvPr/>
         </p:nvGrpSpPr>
@@ -5375,7 +5375,7 @@
         </p:grpSpPr>
         <p:grpSp>
           <p:nvGrpSpPr>
-            <p:cNvPr id="134" name="Gruppierung 133"/>
+            <p:cNvPr id="232" name="Gruppierung 231"/>
             <p:cNvGrpSpPr/>
             <p:nvPr/>
           </p:nvGrpSpPr>
@@ -5390,7 +5390,7 @@
           </p:grpSpPr>
           <p:grpSp>
             <p:nvGrpSpPr>
-              <p:cNvPr id="139" name="Gruppierung 138"/>
+              <p:cNvPr id="237" name="Gruppierung 236"/>
               <p:cNvGrpSpPr/>
               <p:nvPr/>
             </p:nvGrpSpPr>
@@ -5405,7 +5405,7 @@
             </p:grpSpPr>
             <p:sp>
               <p:nvSpPr>
-                <p:cNvPr id="142" name="Rechteck 141"/>
+                <p:cNvPr id="240" name="Rechteck 239"/>
                 <p:cNvSpPr/>
                 <p:nvPr/>
               </p:nvSpPr>
@@ -5450,7 +5450,7 @@
             </p:sp>
             <p:sp>
               <p:nvSpPr>
-                <p:cNvPr id="143" name="Rechteck 142"/>
+                <p:cNvPr id="241" name="Rechteck 240"/>
                 <p:cNvSpPr/>
                 <p:nvPr/>
               </p:nvSpPr>
@@ -5496,7 +5496,7 @@
           </p:grpSp>
           <p:sp>
             <p:nvSpPr>
-              <p:cNvPr id="140" name="Textfeld 139"/>
+              <p:cNvPr id="238" name="Textfeld 237"/>
               <p:cNvSpPr txBox="1"/>
               <p:nvPr/>
             </p:nvSpPr>
@@ -5525,7 +5525,7 @@
           </p:sp>
           <p:sp>
             <p:nvSpPr>
-              <p:cNvPr id="141" name="Textfeld 140"/>
+              <p:cNvPr id="239" name="Textfeld 238"/>
               <p:cNvSpPr txBox="1"/>
               <p:nvPr/>
             </p:nvSpPr>
@@ -5556,7 +5556,7 @@
         </p:grpSp>
         <p:sp>
           <p:nvSpPr>
-            <p:cNvPr id="135" name="Textfeld 134"/>
+            <p:cNvPr id="233" name="Textfeld 232"/>
             <p:cNvSpPr txBox="1"/>
             <p:nvPr/>
           </p:nvSpPr>
@@ -5659,7 +5659,7 @@
         </p:sp>
         <p:grpSp>
           <p:nvGrpSpPr>
-            <p:cNvPr id="136" name="Gruppierung 135"/>
+            <p:cNvPr id="234" name="Gruppierung 233"/>
             <p:cNvGrpSpPr/>
             <p:nvPr/>
           </p:nvGrpSpPr>
@@ -5674,7 +5674,7 @@
           </p:grpSpPr>
           <p:sp>
             <p:nvSpPr>
-              <p:cNvPr id="137" name="Rechteck 136"/>
+              <p:cNvPr id="235" name="Rechteck 234"/>
               <p:cNvSpPr/>
               <p:nvPr/>
             </p:nvSpPr>
@@ -5719,7 +5719,7 @@
           </p:sp>
           <p:sp>
             <p:nvSpPr>
-              <p:cNvPr id="138" name="Rechteck 137"/>
+              <p:cNvPr id="236" name="Rechteck 235"/>
               <p:cNvSpPr/>
               <p:nvPr/>
             </p:nvSpPr>
@@ -5766,7 +5766,7 @@
       </p:grpSp>
       <p:grpSp>
         <p:nvGrpSpPr>
-          <p:cNvPr id="145" name="Gruppierung 144"/>
+          <p:cNvPr id="242" name="Gruppierung 241"/>
           <p:cNvGrpSpPr/>
           <p:nvPr/>
         </p:nvGrpSpPr>
@@ -5786,7 +5786,7 @@
         </p:grpSpPr>
         <p:grpSp>
           <p:nvGrpSpPr>
-            <p:cNvPr id="146" name="Gruppierung 145"/>
+            <p:cNvPr id="243" name="Gruppierung 242"/>
             <p:cNvGrpSpPr/>
             <p:nvPr/>
           </p:nvGrpSpPr>
@@ -5801,7 +5801,7 @@
           </p:grpSpPr>
           <p:grpSp>
             <p:nvGrpSpPr>
-              <p:cNvPr id="151" name="Gruppierung 150"/>
+              <p:cNvPr id="248" name="Gruppierung 247"/>
               <p:cNvGrpSpPr/>
               <p:nvPr/>
             </p:nvGrpSpPr>
@@ -5816,7 +5816,7 @@
             </p:grpSpPr>
             <p:sp>
               <p:nvSpPr>
-                <p:cNvPr id="154" name="Rechteck 153"/>
+                <p:cNvPr id="251" name="Rechteck 250"/>
                 <p:cNvSpPr/>
                 <p:nvPr/>
               </p:nvSpPr>
@@ -5861,7 +5861,7 @@
             </p:sp>
             <p:sp>
               <p:nvSpPr>
-                <p:cNvPr id="155" name="Rechteck 154"/>
+                <p:cNvPr id="252" name="Rechteck 251"/>
                 <p:cNvSpPr/>
                 <p:nvPr/>
               </p:nvSpPr>
@@ -5907,7 +5907,7 @@
           </p:grpSp>
           <p:sp>
             <p:nvSpPr>
-              <p:cNvPr id="152" name="Textfeld 151"/>
+              <p:cNvPr id="249" name="Textfeld 248"/>
               <p:cNvSpPr txBox="1"/>
               <p:nvPr/>
             </p:nvSpPr>
@@ -5936,7 +5936,7 @@
           </p:sp>
           <p:sp>
             <p:nvSpPr>
-              <p:cNvPr id="153" name="Textfeld 152"/>
+              <p:cNvPr id="250" name="Textfeld 249"/>
               <p:cNvSpPr txBox="1"/>
               <p:nvPr/>
             </p:nvSpPr>
@@ -5985,7 +5985,7 @@
         </p:grpSp>
         <p:sp>
           <p:nvSpPr>
-            <p:cNvPr id="147" name="Textfeld 146"/>
+            <p:cNvPr id="244" name="Textfeld 243"/>
             <p:cNvSpPr txBox="1"/>
             <p:nvPr/>
           </p:nvSpPr>
@@ -6033,7 +6033,7 @@
         </p:sp>
         <p:grpSp>
           <p:nvGrpSpPr>
-            <p:cNvPr id="148" name="Gruppierung 147"/>
+            <p:cNvPr id="245" name="Gruppierung 244"/>
             <p:cNvGrpSpPr/>
             <p:nvPr/>
           </p:nvGrpSpPr>
@@ -6048,7 +6048,7 @@
           </p:grpSpPr>
           <p:sp>
             <p:nvSpPr>
-              <p:cNvPr id="149" name="Rechteck 148"/>
+              <p:cNvPr id="246" name="Rechteck 245"/>
               <p:cNvSpPr/>
               <p:nvPr/>
             </p:nvSpPr>
@@ -6093,7 +6093,7 @@
           </p:sp>
           <p:sp>
             <p:nvSpPr>
-              <p:cNvPr id="150" name="Rechteck 149"/>
+              <p:cNvPr id="247" name="Rechteck 246"/>
               <p:cNvSpPr/>
               <p:nvPr/>
             </p:nvSpPr>
@@ -6140,7 +6140,7 @@
       </p:grpSp>
       <p:cxnSp>
         <p:nvCxnSpPr>
-          <p:cNvPr id="159" name="Gewinkelte Verbindung 158"/>
+          <p:cNvPr id="253" name="Gewinkelte Verbindung 252"/>
           <p:cNvCxnSpPr/>
           <p:nvPr/>
         </p:nvCxnSpPr>
@@ -6177,7 +6177,7 @@
       </p:cxnSp>
       <p:cxnSp>
         <p:nvCxnSpPr>
-          <p:cNvPr id="161" name="Gewinkelte Verbindung 160"/>
+          <p:cNvPr id="254" name="Gewinkelte Verbindung 253"/>
           <p:cNvCxnSpPr/>
           <p:nvPr/>
         </p:nvCxnSpPr>
@@ -6214,9 +6214,9 @@
       </p:cxnSp>
       <p:cxnSp>
         <p:nvCxnSpPr>
-          <p:cNvPr id="163" name="Gewinkelte Verbindung 162"/>
+          <p:cNvPr id="255" name="Gewinkelte Verbindung 254"/>
           <p:cNvCxnSpPr>
-            <a:stCxn id="115" idx="3"/>
+            <a:stCxn id="219" idx="3"/>
           </p:cNvCxnSpPr>
           <p:nvPr/>
         </p:nvCxnSpPr>
@@ -6253,9 +6253,9 @@
       </p:cxnSp>
       <p:cxnSp>
         <p:nvCxnSpPr>
-          <p:cNvPr id="165" name="Gewinkelte Verbindung 164"/>
+          <p:cNvPr id="256" name="Gewinkelte Verbindung 255"/>
           <p:cNvCxnSpPr>
-            <a:stCxn id="131" idx="3"/>
+            <a:stCxn id="229" idx="3"/>
           </p:cNvCxnSpPr>
           <p:nvPr/>
         </p:nvCxnSpPr>
@@ -6292,14 +6292,14 @@
       </p:cxnSp>
       <p:cxnSp>
         <p:nvCxnSpPr>
-          <p:cNvPr id="167" name="Gewinkelte Verbindung 166"/>
+          <p:cNvPr id="257" name="Gewinkelte Verbindung 256"/>
           <p:cNvCxnSpPr/>
           <p:nvPr/>
         </p:nvCxnSpPr>
         <p:spPr>
           <a:xfrm>
             <a:off x="30703654" y="6715907"/>
-            <a:ext cx="6141895" cy="4301964"/>
+            <a:ext cx="6141895" cy="1536026"/>
           </a:xfrm>
           <a:prstGeom prst="bentConnector3">
             <a:avLst/>
@@ -6329,14 +6329,14 @@
       </p:cxnSp>
       <p:cxnSp>
         <p:nvCxnSpPr>
-          <p:cNvPr id="169" name="Gewinkelte Verbindung 168"/>
+          <p:cNvPr id="258" name="Gewinkelte Verbindung 257"/>
           <p:cNvCxnSpPr/>
           <p:nvPr/>
         </p:nvCxnSpPr>
         <p:spPr>
           <a:xfrm flipV="1">
-            <a:off x="30795498" y="11170271"/>
-            <a:ext cx="6030243" cy="4185446"/>
+            <a:off x="30795498" y="14968149"/>
+            <a:ext cx="6360323" cy="387568"/>
           </a:xfrm>
           <a:prstGeom prst="bentConnector3">
             <a:avLst/>
@@ -6366,14 +6366,14 @@
       </p:cxnSp>
       <p:sp>
         <p:nvSpPr>
-          <p:cNvPr id="172" name="Textfeld 171"/>
+          <p:cNvPr id="259" name="Textfeld 258"/>
           <p:cNvSpPr txBox="1"/>
           <p:nvPr/>
         </p:nvSpPr>
         <p:spPr>
           <a:xfrm>
             <a:off x="32009182" y="5915413"/>
-            <a:ext cx="5872521" cy="646331"/>
+            <a:ext cx="1996610" cy="646331"/>
           </a:xfrm>
           <a:prstGeom prst="rect">
             <a:avLst/>
@@ -6387,24 +6387,12 @@
           <a:lstStyle/>
           <a:p>
             <a:r>
-              <a:rPr lang="de-DE" sz="3600" dirty="0" err="1"/>
-              <a:t>q</a:t>
-            </a:r>
-            <a:r>
               <a:rPr lang="de-DE" sz="3600" dirty="0" err="1" smtClean="0"/>
-              <a:t>uerry</a:t>
+              <a:t>getPrice</a:t>
             </a:r>
             <a:r>
               <a:rPr lang="de-DE" sz="3600" dirty="0" smtClean="0"/>
-              <a:t>(„SELECT </a:t>
-            </a:r>
-            <a:r>
-              <a:rPr lang="de-DE" sz="3600" dirty="0" err="1" smtClean="0"/>
-              <a:t>LastLifePrice</a:t>
-            </a:r>
-            <a:r>
-              <a:rPr lang="de-DE" sz="3600" dirty="0" smtClean="0"/>
-              <a:t>“)</a:t>
+              <a:t>()</a:t>
             </a:r>
             <a:endParaRPr lang="de-DE" sz="3600" dirty="0"/>
           </a:p>
@@ -6412,7 +6400,7 @@
       </p:sp>
       <p:sp>
         <p:nvSpPr>
-          <p:cNvPr id="173" name="Textfeld 172"/>
+          <p:cNvPr id="260" name="Textfeld 259"/>
           <p:cNvSpPr txBox="1"/>
           <p:nvPr/>
         </p:nvSpPr>
@@ -6450,7 +6438,7 @@
       </p:sp>
       <p:sp>
         <p:nvSpPr>
-          <p:cNvPr id="174" name="Textfeld 173"/>
+          <p:cNvPr id="261" name="Textfeld 260"/>
           <p:cNvSpPr txBox="1"/>
           <p:nvPr/>
         </p:nvSpPr>
@@ -6488,7 +6476,7 @@
       </p:sp>
       <p:sp>
         <p:nvSpPr>
-          <p:cNvPr id="175" name="Textfeld 174"/>
+          <p:cNvPr id="262" name="Textfeld 261"/>
           <p:cNvSpPr txBox="1"/>
           <p:nvPr/>
         </p:nvSpPr>
@@ -6522,7 +6510,7 @@
       </p:sp>
       <p:sp>
         <p:nvSpPr>
-          <p:cNvPr id="176" name="Textfeld 175"/>
+          <p:cNvPr id="263" name="Textfeld 262"/>
           <p:cNvSpPr txBox="1"/>
           <p:nvPr/>
         </p:nvSpPr>
@@ -6556,7 +6544,7 @@
       </p:sp>
       <p:sp>
         <p:nvSpPr>
-          <p:cNvPr id="177" name="Textfeld 176"/>
+          <p:cNvPr id="264" name="Textfeld 263"/>
           <p:cNvSpPr txBox="1"/>
           <p:nvPr/>
         </p:nvSpPr>
@@ -6590,14 +6578,14 @@
       </p:sp>
       <p:sp>
         <p:nvSpPr>
-          <p:cNvPr id="178" name="Textfeld 177"/>
+          <p:cNvPr id="265" name="Textfeld 264"/>
           <p:cNvSpPr txBox="1"/>
           <p:nvPr/>
         </p:nvSpPr>
         <p:spPr>
           <a:xfrm>
             <a:off x="22390489" y="14444929"/>
-            <a:ext cx="3384936" cy="523220"/>
+            <a:ext cx="2992200" cy="523220"/>
           </a:xfrm>
           <a:prstGeom prst="rect">
             <a:avLst/>
@@ -6611,20 +6599,19 @@
           <a:lstStyle/>
           <a:p>
             <a:r>
-              <a:rPr lang="de-DE" sz="2800" dirty="0" err="1" smtClean="0"/>
-              <a:t>sendOrderToMarket</a:t>
-            </a:r>
-            <a:r>
-              <a:rPr lang="de-DE" sz="2800" dirty="0" smtClean="0"/>
-              <a:t>()</a:t>
-            </a:r>
-            <a:endParaRPr lang="de-DE" sz="2800" dirty="0"/>
-          </a:p>
-        </p:txBody>
-      </p:sp>
-      <p:sp>
-        <p:nvSpPr>
-          <p:cNvPr id="179" name="Textfeld 178"/>
+              <a:rPr lang="de-DE" sz="2800" smtClean="0"/>
+              <a:t>reciveOrder</a:t>
+            </a:r>
+            <a:r>
+              <a:rPr lang="de-DE" sz="2800" dirty="0"/>
+              <a:t>(Order)</a:t>
+            </a:r>
+          </a:p>
+        </p:txBody>
+      </p:sp>
+      <p:sp>
+        <p:nvSpPr>
+          <p:cNvPr id="266" name="Textfeld 265"/>
           <p:cNvSpPr txBox="1"/>
           <p:nvPr/>
         </p:nvSpPr>
@@ -6650,11 +6637,7 @@
             </a:r>
             <a:r>
               <a:rPr lang="de-DE" sz="2400" dirty="0" smtClean="0"/>
-              <a:t>(</a:t>
-            </a:r>
-            <a:r>
-              <a:rPr lang="de-DE" sz="2400" dirty="0" smtClean="0"/>
-              <a:t>)</a:t>
+              <a:t>()</a:t>
             </a:r>
           </a:p>
           <a:p>
@@ -6664,11 +6647,7 @@
             </a:r>
             <a:r>
               <a:rPr lang="de-DE" sz="2400" dirty="0" smtClean="0"/>
-              <a:t>(</a:t>
-            </a:r>
-            <a:r>
-              <a:rPr lang="de-DE" sz="2400" dirty="0" smtClean="0"/>
-              <a:t>)</a:t>
+              <a:t>()</a:t>
             </a:r>
             <a:endParaRPr lang="de-DE" sz="2400" dirty="0"/>
           </a:p>
@@ -6676,7 +6655,7 @@
       </p:sp>
       <p:sp>
         <p:nvSpPr>
-          <p:cNvPr id="180" name="Textfeld 179"/>
+          <p:cNvPr id="267" name="Textfeld 266"/>
           <p:cNvSpPr txBox="1"/>
           <p:nvPr/>
         </p:nvSpPr>
@@ -6710,7 +6689,7 @@
       </p:sp>
       <p:sp>
         <p:nvSpPr>
-          <p:cNvPr id="156" name="Textfeld 155"/>
+          <p:cNvPr id="268" name="Textfeld 267"/>
           <p:cNvSpPr txBox="1"/>
           <p:nvPr/>
         </p:nvSpPr>
@@ -6741,7 +6720,7 @@
             </a:r>
             <a:r>
               <a:rPr lang="de-DE" sz="2600" dirty="0" err="1" smtClean="0"/>
-              <a:t>sendOrderToMarket</a:t>
+              <a:t>reciveOrder</a:t>
             </a:r>
             <a:r>
               <a:rPr lang="de-DE" sz="2600" dirty="0" smtClean="0"/>
@@ -6761,7 +6740,7 @@
       </p:sp>
       <p:sp>
         <p:nvSpPr>
-          <p:cNvPr id="16" name="Rechteck 15"/>
+          <p:cNvPr id="269" name="Rechteck 268"/>
           <p:cNvSpPr/>
           <p:nvPr/>
         </p:nvSpPr>
@@ -6817,7 +6796,7 @@
       </p:sp>
       <p:sp>
         <p:nvSpPr>
-          <p:cNvPr id="157" name="Rechteck 156"/>
+          <p:cNvPr id="270" name="Rechteck 269"/>
           <p:cNvSpPr/>
           <p:nvPr/>
         </p:nvSpPr>
@@ -6873,7 +6852,7 @@
       </p:sp>
       <p:sp>
         <p:nvSpPr>
-          <p:cNvPr id="160" name="Textfeld 159"/>
+          <p:cNvPr id="271" name="Textfeld 270"/>
           <p:cNvSpPr txBox="1"/>
           <p:nvPr/>
         </p:nvSpPr>
@@ -6956,7 +6935,7 @@
       </p:sp>
       <p:sp>
         <p:nvSpPr>
-          <p:cNvPr id="162" name="Textfeld 161"/>
+          <p:cNvPr id="272" name="Textfeld 271"/>
           <p:cNvSpPr txBox="1"/>
           <p:nvPr/>
         </p:nvSpPr>
@@ -7039,7 +7018,7 @@
       </p:sp>
       <p:sp>
         <p:nvSpPr>
-          <p:cNvPr id="17" name="Textfeld 16"/>
+          <p:cNvPr id="273" name="Textfeld 272"/>
           <p:cNvSpPr txBox="1"/>
           <p:nvPr/>
         </p:nvSpPr>
@@ -7065,7 +7044,7 @@
       </p:sp>
       <p:sp>
         <p:nvSpPr>
-          <p:cNvPr id="164" name="Textfeld 163"/>
+          <p:cNvPr id="274" name="Textfeld 273"/>
           <p:cNvSpPr txBox="1"/>
           <p:nvPr/>
         </p:nvSpPr>
@@ -7146,6 +7125,293 @@
           </a:p>
         </p:txBody>
       </p:sp>
+      <p:grpSp>
+        <p:nvGrpSpPr>
+          <p:cNvPr id="275" name="Gruppierung 274"/>
+          <p:cNvGrpSpPr/>
+          <p:nvPr/>
+        </p:nvGrpSpPr>
+        <p:grpSpPr>
+          <a:xfrm>
+            <a:off x="37047446" y="7438169"/>
+            <a:ext cx="5625275" cy="4626952"/>
+            <a:chOff x="1175283" y="407242"/>
+            <a:chExt cx="2018837" cy="2303261"/>
+          </a:xfrm>
+          <a:solidFill>
+            <a:schemeClr val="tx2">
+              <a:lumMod val="20000"/>
+              <a:lumOff val="80000"/>
+            </a:schemeClr>
+          </a:solidFill>
+        </p:grpSpPr>
+        <p:grpSp>
+          <p:nvGrpSpPr>
+            <p:cNvPr id="276" name="Gruppierung 275"/>
+            <p:cNvGrpSpPr/>
+            <p:nvPr/>
+          </p:nvGrpSpPr>
+          <p:grpSpPr>
+            <a:xfrm>
+              <a:off x="1175283" y="407242"/>
+              <a:ext cx="2018837" cy="2303261"/>
+              <a:chOff x="1307978" y="975879"/>
+              <a:chExt cx="1431194" cy="2303261"/>
+            </a:xfrm>
+            <a:grpFill/>
+          </p:grpSpPr>
+          <p:grpSp>
+            <p:nvGrpSpPr>
+              <p:cNvPr id="278" name="Gruppierung 277"/>
+              <p:cNvGrpSpPr/>
+              <p:nvPr/>
+            </p:nvGrpSpPr>
+            <p:grpSpPr>
+              <a:xfrm>
+                <a:off x="1307978" y="976160"/>
+                <a:ext cx="1431194" cy="2302980"/>
+                <a:chOff x="1307978" y="976160"/>
+                <a:chExt cx="1431194" cy="2302980"/>
+              </a:xfrm>
+              <a:grpFill/>
+            </p:grpSpPr>
+            <p:sp>
+              <p:nvSpPr>
+                <p:cNvPr id="281" name="Rechteck 280"/>
+                <p:cNvSpPr/>
+                <p:nvPr/>
+              </p:nvSpPr>
+              <p:spPr>
+                <a:xfrm>
+                  <a:off x="1307978" y="976160"/>
+                  <a:ext cx="1431194" cy="2302980"/>
+                </a:xfrm>
+                <a:prstGeom prst="rect">
+                  <a:avLst/>
+                </a:prstGeom>
+                <a:grpFill/>
+                <a:ln w="12700" cmpd="sng">
+                  <a:solidFill>
+                    <a:schemeClr val="tx1"/>
+                  </a:solidFill>
+                </a:ln>
+                <a:effectLst/>
+              </p:spPr>
+              <p:style>
+                <a:lnRef idx="1">
+                  <a:schemeClr val="accent1"/>
+                </a:lnRef>
+                <a:fillRef idx="3">
+                  <a:schemeClr val="accent1"/>
+                </a:fillRef>
+                <a:effectRef idx="2">
+                  <a:schemeClr val="accent1"/>
+                </a:effectRef>
+                <a:fontRef idx="minor">
+                  <a:schemeClr val="lt1"/>
+                </a:fontRef>
+              </p:style>
+              <p:txBody>
+                <a:bodyPr rtlCol="0" anchor="ctr"/>
+                <a:lstStyle/>
+                <a:p>
+                  <a:pPr algn="ctr"/>
+                  <a:endParaRPr lang="de-DE" sz="2600"/>
+                </a:p>
+              </p:txBody>
+            </p:sp>
+            <p:sp>
+              <p:nvSpPr>
+                <p:cNvPr id="282" name="Rechteck 281"/>
+                <p:cNvSpPr/>
+                <p:nvPr/>
+              </p:nvSpPr>
+              <p:spPr>
+                <a:xfrm>
+                  <a:off x="1307978" y="976160"/>
+                  <a:ext cx="1431194" cy="304865"/>
+                </a:xfrm>
+                <a:prstGeom prst="rect">
+                  <a:avLst/>
+                </a:prstGeom>
+                <a:grpFill/>
+                <a:ln w="12700" cmpd="sng">
+                  <a:solidFill>
+                    <a:schemeClr val="tx1"/>
+                  </a:solidFill>
+                </a:ln>
+                <a:effectLst/>
+              </p:spPr>
+              <p:style>
+                <a:lnRef idx="1">
+                  <a:schemeClr val="accent1"/>
+                </a:lnRef>
+                <a:fillRef idx="3">
+                  <a:schemeClr val="accent1"/>
+                </a:fillRef>
+                <a:effectRef idx="2">
+                  <a:schemeClr val="accent1"/>
+                </a:effectRef>
+                <a:fontRef idx="minor">
+                  <a:schemeClr val="lt1"/>
+                </a:fontRef>
+              </p:style>
+              <p:txBody>
+                <a:bodyPr rtlCol="0" anchor="ctr"/>
+                <a:lstStyle/>
+                <a:p>
+                  <a:pPr algn="ctr"/>
+                  <a:endParaRPr lang="de-DE" sz="2600"/>
+                </a:p>
+              </p:txBody>
+            </p:sp>
+          </p:grpSp>
+          <p:sp>
+            <p:nvSpPr>
+              <p:cNvPr id="279" name="Textfeld 278"/>
+              <p:cNvSpPr txBox="1"/>
+              <p:nvPr/>
+            </p:nvSpPr>
+            <p:spPr>
+              <a:xfrm>
+                <a:off x="1347448" y="975879"/>
+                <a:ext cx="1364847" cy="245134"/>
+              </a:xfrm>
+              <a:prstGeom prst="rect">
+                <a:avLst/>
+              </a:prstGeom>
+              <a:grpFill/>
+            </p:spPr>
+            <p:txBody>
+              <a:bodyPr wrap="square" rtlCol="0">
+                <a:spAutoFit/>
+              </a:bodyPr>
+              <a:lstStyle/>
+              <a:p>
+                <a:r>
+                  <a:rPr lang="de-DE" sz="2600" b="1" dirty="0" err="1" smtClean="0"/>
+                  <a:t>YahooConnector</a:t>
+                </a:r>
+                <a:endParaRPr lang="de-DE" sz="2600" b="1" dirty="0"/>
+              </a:p>
+            </p:txBody>
+          </p:sp>
+          <p:sp>
+            <p:nvSpPr>
+              <p:cNvPr id="280" name="Textfeld 279"/>
+              <p:cNvSpPr txBox="1"/>
+              <p:nvPr/>
+            </p:nvSpPr>
+            <p:spPr>
+              <a:xfrm>
+                <a:off x="1307978" y="1885981"/>
+                <a:ext cx="1431194" cy="1041820"/>
+              </a:xfrm>
+              <a:prstGeom prst="rect">
+                <a:avLst/>
+              </a:prstGeom>
+              <a:grpFill/>
+            </p:spPr>
+            <p:txBody>
+              <a:bodyPr wrap="square" rtlCol="0">
+                <a:spAutoFit/>
+              </a:bodyPr>
+              <a:lstStyle/>
+              <a:p>
+                <a:pPr marL="719892" indent="-719892">
+                  <a:buFont typeface="Wingdings" charset="2"/>
+                  <a:buChar char="§"/>
+                </a:pPr>
+                <a:r>
+                  <a:rPr lang="de-DE" sz="2600" dirty="0" err="1"/>
+                  <a:t>l</a:t>
+                </a:r>
+                <a:r>
+                  <a:rPr lang="de-DE" sz="2600" dirty="0" err="1" smtClean="0"/>
+                  <a:t>oadDataFromYahooFinance</a:t>
+                </a:r>
+                <a:r>
+                  <a:rPr lang="de-DE" sz="2600" dirty="0" smtClean="0"/>
+                  <a:t>()</a:t>
+                </a:r>
+              </a:p>
+              <a:p>
+                <a:pPr marL="719892" indent="-719892">
+                  <a:buFont typeface="Wingdings" charset="2"/>
+                  <a:buChar char="§"/>
+                </a:pPr>
+                <a:r>
+                  <a:rPr lang="de-DE" sz="2600" dirty="0" err="1" smtClean="0"/>
+                  <a:t>getPrice</a:t>
+                </a:r>
+                <a:r>
+                  <a:rPr lang="de-DE" sz="2600" dirty="0" smtClean="0"/>
+                  <a:t>()</a:t>
+                </a:r>
+                <a:endParaRPr lang="de-DE" sz="2600" dirty="0"/>
+              </a:p>
+              <a:p>
+                <a:pPr marL="719892" indent="-719892"/>
+                <a:endParaRPr lang="de-DE" sz="2600" dirty="0"/>
+              </a:p>
+              <a:p>
+                <a:pPr marL="719892" indent="-719892">
+                  <a:buFont typeface="Wingdings" charset="2"/>
+                  <a:buChar char="§"/>
+                </a:pPr>
+                <a:endParaRPr lang="de-DE" sz="2600" dirty="0"/>
+              </a:p>
+              <a:p>
+                <a:pPr marL="719892" indent="-719892">
+                  <a:buFont typeface="Wingdings" charset="2"/>
+                  <a:buChar char="§"/>
+                </a:pPr>
+                <a:endParaRPr lang="de-DE" sz="2600" dirty="0"/>
+              </a:p>
+            </p:txBody>
+          </p:sp>
+        </p:grpSp>
+        <p:sp>
+          <p:nvSpPr>
+            <p:cNvPr id="277" name="Textfeld 276"/>
+            <p:cNvSpPr txBox="1"/>
+            <p:nvPr/>
+          </p:nvSpPr>
+          <p:spPr>
+            <a:xfrm>
+              <a:off x="1175283" y="712869"/>
+              <a:ext cx="2018837" cy="444305"/>
+            </a:xfrm>
+            <a:prstGeom prst="rect">
+              <a:avLst/>
+            </a:prstGeom>
+            <a:grpFill/>
+          </p:spPr>
+          <p:txBody>
+            <a:bodyPr wrap="square" rtlCol="0">
+              <a:spAutoFit/>
+            </a:bodyPr>
+            <a:lstStyle/>
+            <a:p>
+              <a:r>
+                <a:rPr lang="de-DE" sz="2600" dirty="0"/>
+                <a:t> </a:t>
+              </a:r>
+              <a:r>
+                <a:rPr lang="de-DE" sz="2600" dirty="0" smtClean="0"/>
+                <a:t>+ </a:t>
+              </a:r>
+              <a:endParaRPr lang="de-DE" sz="2600" dirty="0"/>
+            </a:p>
+            <a:p>
+              <a:r>
+                <a:rPr lang="de-DE" sz="2600" dirty="0"/>
+                <a:t> </a:t>
+              </a:r>
+            </a:p>
+          </p:txBody>
+        </p:sp>
+      </p:grpSp>
     </p:spTree>
     <p:extLst>
       <p:ext uri="{BB962C8B-B14F-4D97-AF65-F5344CB8AC3E}">

</xml_diff>

<commit_message>
Random trader, created. Jas library added,
</commit_message>
<xml_diff>
--- a/EC910GroupProject/Model/UML.pptx
+++ b/EC910GroupProject/Model/UML.pptx
@@ -1,6 +1,6 @@
 
 <file path=ppt/presentation.xml><?xml version="1.0" encoding="utf-8"?>
-<p:presentation xmlns:a="http://schemas.openxmlformats.org/drawingml/2006/main" xmlns:r="http://schemas.openxmlformats.org/officeDocument/2006/relationships" xmlns:p="http://schemas.openxmlformats.org/presentationml/2006/main" serverZoom="35368" saveSubsetFonts="1" autoCompressPictures="0">
+<p:presentation xmlns:a="http://schemas.openxmlformats.org/drawingml/2006/main" xmlns:r="http://schemas.openxmlformats.org/officeDocument/2006/relationships" xmlns:p="http://schemas.openxmlformats.org/presentationml/2006/main" serverZoom="33086" saveSubsetFonts="1" autoCompressPictures="0">
   <p:sldMasterIdLst>
     <p:sldMasterId id="2147483648" r:id="rId1"/>
   </p:sldMasterIdLst>
@@ -304,7 +304,7 @@
           <a:p>
             <a:fld id="{1379CE38-DE0F-0843-BE6F-9C326E4C062F}" type="datetimeFigureOut">
               <a:rPr lang="de-DE" smtClean="0"/>
-              <a:t>09.12.2015</a:t>
+              <a:t>11.12.2015</a:t>
             </a:fld>
             <a:endParaRPr lang="de-DE"/>
           </a:p>
@@ -474,7 +474,7 @@
           <a:p>
             <a:fld id="{1379CE38-DE0F-0843-BE6F-9C326E4C062F}" type="datetimeFigureOut">
               <a:rPr lang="de-DE" smtClean="0"/>
-              <a:t>09.12.2015</a:t>
+              <a:t>11.12.2015</a:t>
             </a:fld>
             <a:endParaRPr lang="de-DE"/>
           </a:p>
@@ -654,7 +654,7 @@
           <a:p>
             <a:fld id="{1379CE38-DE0F-0843-BE6F-9C326E4C062F}" type="datetimeFigureOut">
               <a:rPr lang="de-DE" smtClean="0"/>
-              <a:t>09.12.2015</a:t>
+              <a:t>11.12.2015</a:t>
             </a:fld>
             <a:endParaRPr lang="de-DE"/>
           </a:p>
@@ -824,7 +824,7 @@
           <a:p>
             <a:fld id="{1379CE38-DE0F-0843-BE6F-9C326E4C062F}" type="datetimeFigureOut">
               <a:rPr lang="de-DE" smtClean="0"/>
-              <a:t>09.12.2015</a:t>
+              <a:t>11.12.2015</a:t>
             </a:fld>
             <a:endParaRPr lang="de-DE"/>
           </a:p>
@@ -1070,7 +1070,7 @@
           <a:p>
             <a:fld id="{1379CE38-DE0F-0843-BE6F-9C326E4C062F}" type="datetimeFigureOut">
               <a:rPr lang="de-DE" smtClean="0"/>
-              <a:t>09.12.2015</a:t>
+              <a:t>11.12.2015</a:t>
             </a:fld>
             <a:endParaRPr lang="de-DE"/>
           </a:p>
@@ -1358,7 +1358,7 @@
           <a:p>
             <a:fld id="{1379CE38-DE0F-0843-BE6F-9C326E4C062F}" type="datetimeFigureOut">
               <a:rPr lang="de-DE" smtClean="0"/>
-              <a:t>09.12.2015</a:t>
+              <a:t>11.12.2015</a:t>
             </a:fld>
             <a:endParaRPr lang="de-DE"/>
           </a:p>
@@ -1785,7 +1785,7 @@
           <a:p>
             <a:fld id="{1379CE38-DE0F-0843-BE6F-9C326E4C062F}" type="datetimeFigureOut">
               <a:rPr lang="de-DE" smtClean="0"/>
-              <a:t>09.12.2015</a:t>
+              <a:t>11.12.2015</a:t>
             </a:fld>
             <a:endParaRPr lang="de-DE"/>
           </a:p>
@@ -1903,7 +1903,7 @@
           <a:p>
             <a:fld id="{1379CE38-DE0F-0843-BE6F-9C326E4C062F}" type="datetimeFigureOut">
               <a:rPr lang="de-DE" smtClean="0"/>
-              <a:t>09.12.2015</a:t>
+              <a:t>11.12.2015</a:t>
             </a:fld>
             <a:endParaRPr lang="de-DE"/>
           </a:p>
@@ -1998,7 +1998,7 @@
           <a:p>
             <a:fld id="{1379CE38-DE0F-0843-BE6F-9C326E4C062F}" type="datetimeFigureOut">
               <a:rPr lang="de-DE" smtClean="0"/>
-              <a:t>09.12.2015</a:t>
+              <a:t>11.12.2015</a:t>
             </a:fld>
             <a:endParaRPr lang="de-DE"/>
           </a:p>
@@ -2275,7 +2275,7 @@
           <a:p>
             <a:fld id="{1379CE38-DE0F-0843-BE6F-9C326E4C062F}" type="datetimeFigureOut">
               <a:rPr lang="de-DE" smtClean="0"/>
-              <a:t>09.12.2015</a:t>
+              <a:t>11.12.2015</a:t>
             </a:fld>
             <a:endParaRPr lang="de-DE"/>
           </a:p>
@@ -2528,7 +2528,7 @@
           <a:p>
             <a:fld id="{1379CE38-DE0F-0843-BE6F-9C326E4C062F}" type="datetimeFigureOut">
               <a:rPr lang="de-DE" smtClean="0"/>
-              <a:t>09.12.2015</a:t>
+              <a:t>11.12.2015</a:t>
             </a:fld>
             <a:endParaRPr lang="de-DE"/>
           </a:p>
@@ -2741,7 +2741,7 @@
           <a:p>
             <a:fld id="{1379CE38-DE0F-0843-BE6F-9C326E4C062F}" type="datetimeFigureOut">
               <a:rPr lang="de-DE" smtClean="0"/>
-              <a:t>09.12.2015</a:t>
+              <a:t>11.12.2015</a:t>
             </a:fld>
             <a:endParaRPr lang="de-DE"/>
           </a:p>
@@ -3124,8 +3124,8 @@
         </p:nvGrpSpPr>
         <p:grpSpPr>
           <a:xfrm>
-            <a:off x="2593786" y="3624979"/>
-            <a:ext cx="6526744" cy="4626954"/>
+            <a:off x="2593785" y="3624979"/>
+            <a:ext cx="8309865" cy="4626954"/>
             <a:chOff x="1175283" y="407242"/>
             <a:chExt cx="2018837" cy="2303261"/>
           </a:xfrm>
@@ -3296,7 +3296,7 @@
           <p:spPr>
             <a:xfrm>
               <a:off x="1175283" y="712869"/>
-              <a:ext cx="2018837" cy="643477"/>
+              <a:ext cx="2018837" cy="857969"/>
             </a:xfrm>
             <a:prstGeom prst="rect">
               <a:avLst/>
@@ -3317,16 +3317,31 @@
             <a:p>
               <a:r>
                 <a:rPr lang="de-DE" sz="2600" dirty="0"/>
-                <a:t> + </a:t>
+                <a:t> + Artificial </a:t>
               </a:r>
               <a:r>
-                <a:rPr lang="de-DE" sz="2600" dirty="0" err="1"/>
-                <a:t>Artificial</a:t>
+                <a:rPr lang="de-DE" sz="2600" dirty="0" smtClean="0"/>
+                <a:t>Market</a:t>
+              </a:r>
+            </a:p>
+            <a:p>
+              <a:r>
+                <a:rPr lang="en-GB" sz="2800" dirty="0" smtClean="0"/>
+                <a:t>+ </a:t>
               </a:r>
               <a:r>
-                <a:rPr lang="de-DE" sz="2600" dirty="0"/>
-                <a:t> Market</a:t>
+                <a:rPr lang="en-GB" sz="2800" dirty="0" err="1" smtClean="0"/>
+                <a:t>max_buy</a:t>
               </a:r>
+              <a:r>
+                <a:rPr lang="en-GB" sz="2800" dirty="0" smtClean="0"/>
+                <a:t> &amp; </a:t>
+              </a:r>
+              <a:r>
+                <a:rPr lang="en-GB" sz="2800" dirty="0" err="1" smtClean="0"/>
+                <a:t>max_sell</a:t>
+              </a:r>
+              <a:endParaRPr lang="de-DE" sz="2600" dirty="0"/>
             </a:p>
             <a:p>
               <a:endParaRPr lang="de-DE" sz="2600" dirty="0"/>
@@ -4359,8 +4374,8 @@
         </p:nvGrpSpPr>
         <p:grpSpPr>
           <a:xfrm>
-            <a:off x="11937338" y="7980212"/>
-            <a:ext cx="6526744" cy="4626956"/>
+            <a:off x="9085006" y="8334296"/>
+            <a:ext cx="9379076" cy="4272872"/>
             <a:chOff x="1175283" y="407242"/>
             <a:chExt cx="2018837" cy="2303261"/>
           </a:xfrm>
@@ -4538,7 +4553,7 @@
             <p:spPr>
               <a:xfrm>
                 <a:off x="1307978" y="2065705"/>
-                <a:ext cx="1431194" cy="689439"/>
+                <a:ext cx="1431194" cy="746572"/>
               </a:xfrm>
               <a:prstGeom prst="rect">
                 <a:avLst/>
@@ -4556,16 +4571,8 @@
                   <a:buChar char="§"/>
                 </a:pPr>
                 <a:r>
-                  <a:rPr lang="de-DE" sz="2800" dirty="0" err="1"/>
-                  <a:t>runStrategy</a:t>
-                </a:r>
-                <a:r>
                   <a:rPr lang="de-DE" sz="2800" dirty="0"/>
-                  <a:t>(</a:t>
-                </a:r>
-                <a:r>
-                  <a:rPr lang="de-DE" sz="2800" dirty="0" smtClean="0"/>
-                  <a:t>)</a:t>
+                  <a:t>order::runStrategy()</a:t>
                 </a:r>
               </a:p>
               <a:p>
@@ -4575,15 +4582,11 @@
                 </a:pPr>
                 <a:r>
                   <a:rPr lang="de-DE" sz="2800" dirty="0" smtClean="0"/>
-                  <a:t>Share::</a:t>
+                  <a:t>Share</a:t>
                 </a:r>
                 <a:r>
-                  <a:rPr lang="de-DE" sz="2800" dirty="0" err="1" smtClean="0"/>
-                  <a:t>buyShareFromTrader</a:t>
-                </a:r>
-                <a:r>
-                  <a:rPr lang="de-DE" sz="2800" dirty="0" smtClean="0"/>
-                  <a:t>(Money)</a:t>
+                  <a:rPr lang="de-DE" sz="2800" dirty="0"/>
+                  <a:t>::buyShareFromTrader (Money,shares)</a:t>
                 </a:r>
               </a:p>
               <a:p>
@@ -4592,16 +4595,8 @@
                   <a:buChar char="§"/>
                 </a:pPr>
                 <a:r>
-                  <a:rPr lang="de-DE" sz="2800" dirty="0" smtClean="0"/>
-                  <a:t>Money::</a:t>
-                </a:r>
-                <a:r>
-                  <a:rPr lang="de-DE" sz="2800" dirty="0" err="1" smtClean="0"/>
-                  <a:t>sellShareToTrader</a:t>
-                </a:r>
-                <a:r>
-                  <a:rPr lang="de-DE" sz="2800" dirty="0" smtClean="0"/>
-                  <a:t>(Share)</a:t>
+                  <a:rPr lang="de-DE" sz="2800" dirty="0"/>
+                  <a:t>Money::sellShareToTrader(Money,shares)</a:t>
                 </a:r>
                 <a:endParaRPr lang="de-DE" sz="2800" dirty="0"/>
               </a:p>
@@ -4673,8 +4668,8 @@
         </p:nvGrpSpPr>
         <p:grpSpPr>
           <a:xfrm>
-            <a:off x="11927738" y="12841118"/>
-            <a:ext cx="6588548" cy="4626955"/>
+            <a:off x="9085006" y="12841118"/>
+            <a:ext cx="9431280" cy="4626955"/>
             <a:chOff x="8049393" y="6956415"/>
             <a:chExt cx="4021826" cy="3100324"/>
           </a:xfrm>
@@ -5013,8 +5008,8 @@
         </p:nvGrpSpPr>
         <p:grpSpPr>
           <a:xfrm>
-            <a:off x="11953840" y="18089008"/>
-            <a:ext cx="6588548" cy="4626955"/>
+            <a:off x="9085006" y="18089008"/>
+            <a:ext cx="9457382" cy="4626955"/>
             <a:chOff x="8049393" y="6956415"/>
             <a:chExt cx="4021826" cy="3100324"/>
           </a:xfrm>
@@ -6102,8 +6097,103 @@
               <a:bodyPr rtlCol="0" anchor="ctr"/>
               <a:lstStyle/>
               <a:p>
-                <a:pPr algn="ctr"/>
-                <a:endParaRPr lang="de-DE" sz="2600"/>
+                <a:pPr marL="457200" indent="-457200">
+                  <a:buFontTx/>
+                  <a:buChar char="-"/>
+                </a:pPr>
+                <a:r>
+                  <a:rPr lang="de-DE" sz="2600" dirty="0" smtClean="0">
+                    <a:solidFill>
+                      <a:schemeClr val="tx1"/>
+                    </a:solidFill>
+                  </a:rPr>
+                  <a:t>shares::getShares()</a:t>
+                </a:r>
+              </a:p>
+              <a:p>
+                <a:pPr marL="457200" indent="-457200">
+                  <a:buFontTx/>
+                  <a:buChar char="-"/>
+                </a:pPr>
+                <a:r>
+                  <a:rPr lang="de-DE" sz="2600" dirty="0">
+                    <a:solidFill>
+                      <a:schemeClr val="tx1"/>
+                    </a:solidFill>
+                  </a:rPr>
+                  <a:t>setShares(int shares</a:t>
+                </a:r>
+                <a:r>
+                  <a:rPr lang="de-DE" sz="2600" dirty="0" smtClean="0">
+                    <a:solidFill>
+                      <a:schemeClr val="tx1"/>
+                    </a:solidFill>
+                  </a:rPr>
+                  <a:t>)</a:t>
+                </a:r>
+              </a:p>
+              <a:p>
+                <a:pPr marL="457200" indent="-457200">
+                  <a:buFontTx/>
+                  <a:buChar char="-"/>
+                </a:pPr>
+                <a:r>
+                  <a:rPr lang="de-DE" sz="2600" dirty="0" smtClean="0">
+                    <a:solidFill>
+                      <a:schemeClr val="tx1"/>
+                    </a:solidFill>
+                  </a:rPr>
+                  <a:t>money::getMoney()</a:t>
+                </a:r>
+              </a:p>
+              <a:p>
+                <a:pPr marL="457200" indent="-457200">
+                  <a:buFontTx/>
+                  <a:buChar char="-"/>
+                </a:pPr>
+                <a:r>
+                  <a:rPr lang="de-DE" sz="2600" dirty="0">
+                    <a:solidFill>
+                      <a:schemeClr val="tx1"/>
+                    </a:solidFill>
+                  </a:rPr>
+                  <a:t>setMoney(int </a:t>
+                </a:r>
+                <a:r>
+                  <a:rPr lang="de-DE" sz="2600" dirty="0" smtClean="0">
+                    <a:solidFill>
+                      <a:schemeClr val="tx1"/>
+                    </a:solidFill>
+                  </a:rPr>
+                  <a:t>money )</a:t>
+                </a:r>
+                <a:endParaRPr lang="de-DE" sz="2600" dirty="0" smtClean="0">
+                  <a:solidFill>
+                    <a:schemeClr val="tx1"/>
+                  </a:solidFill>
+                </a:endParaRPr>
+              </a:p>
+              <a:p>
+                <a:pPr marL="457200" indent="-457200">
+                  <a:buFontTx/>
+                  <a:buChar char="-"/>
+                </a:pPr>
+                <a:endParaRPr lang="de-DE" sz="2600" dirty="0" smtClean="0">
+                  <a:solidFill>
+                    <a:schemeClr val="tx1"/>
+                  </a:solidFill>
+                </a:endParaRPr>
+              </a:p>
+              <a:p>
+                <a:pPr marL="457200" indent="-457200">
+                  <a:buFontTx/>
+                  <a:buChar char="-"/>
+                </a:pPr>
+                <a:endParaRPr lang="de-DE" sz="2600" dirty="0">
+                  <a:solidFill>
+                    <a:schemeClr val="tx1"/>
+                  </a:solidFill>
+                </a:endParaRPr>
               </a:p>
             </p:txBody>
           </p:sp>
@@ -6874,8 +6964,8 @@
         </p:nvSpPr>
         <p:spPr>
           <a:xfrm>
-            <a:off x="11924939" y="14747746"/>
-            <a:ext cx="6526744" cy="1384995"/>
+            <a:off x="9115056" y="14423212"/>
+            <a:ext cx="9277835" cy="1815882"/>
           </a:xfrm>
           <a:prstGeom prst="rect">
             <a:avLst/>
@@ -6898,16 +6988,8 @@
               <a:buChar char="§"/>
             </a:pPr>
             <a:r>
-              <a:rPr lang="de-DE" sz="2800" dirty="0" err="1"/>
-              <a:t>runStrategy</a:t>
-            </a:r>
-            <a:r>
               <a:rPr lang="de-DE" sz="2800" dirty="0"/>
-              <a:t>(</a:t>
-            </a:r>
-            <a:r>
-              <a:rPr lang="de-DE" sz="2800" dirty="0" smtClean="0"/>
-              <a:t>)</a:t>
+              <a:t>order::runStrategy()</a:t>
             </a:r>
           </a:p>
           <a:p>
@@ -6917,15 +6999,11 @@
             </a:pPr>
             <a:r>
               <a:rPr lang="de-DE" sz="2800" dirty="0" smtClean="0"/>
-              <a:t>Share::</a:t>
-            </a:r>
-            <a:r>
-              <a:rPr lang="de-DE" sz="2800" dirty="0" err="1" smtClean="0"/>
-              <a:t>buyShareFromTrader</a:t>
-            </a:r>
-            <a:r>
-              <a:rPr lang="de-DE" sz="2800" dirty="0" smtClean="0"/>
-              <a:t>(Money)</a:t>
+              <a:t>Share</a:t>
+            </a:r>
+            <a:r>
+              <a:rPr lang="de-DE" sz="2800" dirty="0"/>
+              <a:t>::buyShareFromTrader (Money,shares)</a:t>
             </a:r>
           </a:p>
           <a:p>
@@ -6934,17 +7012,19 @@
               <a:buChar char="§"/>
             </a:pPr>
             <a:r>
+              <a:rPr lang="de-DE" sz="2800" dirty="0"/>
+              <a:t>Money::sellShareToTrader(Money,shares</a:t>
+            </a:r>
+            <a:r>
               <a:rPr lang="de-DE" sz="2800" dirty="0" smtClean="0"/>
-              <a:t>Money::</a:t>
-            </a:r>
-            <a:r>
-              <a:rPr lang="de-DE" sz="2800" dirty="0" err="1" smtClean="0"/>
-              <a:t>sellShareToTrader</a:t>
-            </a:r>
-            <a:r>
-              <a:rPr lang="de-DE" sz="2800" dirty="0" smtClean="0"/>
-              <a:t>(Share)</a:t>
-            </a:r>
+              <a:t>)</a:t>
+            </a:r>
+          </a:p>
+          <a:p>
+            <a:pPr marL="712693" indent="-712693">
+              <a:buFont typeface="Wingdings" charset="2"/>
+              <a:buChar char="§"/>
+            </a:pPr>
             <a:endParaRPr lang="de-DE" sz="2800" dirty="0"/>
           </a:p>
         </p:txBody>
@@ -6957,8 +7037,8 @@
         </p:nvSpPr>
         <p:spPr>
           <a:xfrm>
-            <a:off x="11960286" y="20064113"/>
-            <a:ext cx="6526744" cy="1384995"/>
+            <a:off x="9125045" y="20064113"/>
+            <a:ext cx="9361985" cy="1384995"/>
           </a:xfrm>
           <a:prstGeom prst="rect">
             <a:avLst/>
@@ -6981,16 +7061,8 @@
               <a:buChar char="§"/>
             </a:pPr>
             <a:r>
-              <a:rPr lang="de-DE" sz="2800" dirty="0" err="1"/>
-              <a:t>runStrategy</a:t>
-            </a:r>
-            <a:r>
               <a:rPr lang="de-DE" sz="2800" dirty="0"/>
-              <a:t>(</a:t>
-            </a:r>
-            <a:r>
-              <a:rPr lang="de-DE" sz="2800" dirty="0" smtClean="0"/>
-              <a:t>)</a:t>
+              <a:t>order::runStrategy()</a:t>
             </a:r>
           </a:p>
           <a:p>
@@ -7000,15 +7072,11 @@
             </a:pPr>
             <a:r>
               <a:rPr lang="de-DE" sz="2800" dirty="0" smtClean="0"/>
-              <a:t>Share::</a:t>
-            </a:r>
-            <a:r>
-              <a:rPr lang="de-DE" sz="2800" dirty="0" err="1" smtClean="0"/>
-              <a:t>buyShareFromTrader</a:t>
-            </a:r>
-            <a:r>
-              <a:rPr lang="de-DE" sz="2800" dirty="0" smtClean="0"/>
-              <a:t>(Money)</a:t>
+              <a:t>Share</a:t>
+            </a:r>
+            <a:r>
+              <a:rPr lang="de-DE" sz="2800" dirty="0"/>
+              <a:t>::buyShareFromTrader (Money,shares)</a:t>
             </a:r>
           </a:p>
           <a:p>
@@ -7017,16 +7085,8 @@
               <a:buChar char="§"/>
             </a:pPr>
             <a:r>
-              <a:rPr lang="de-DE" sz="2800" dirty="0" smtClean="0"/>
-              <a:t>Money::</a:t>
-            </a:r>
-            <a:r>
-              <a:rPr lang="de-DE" sz="2800" dirty="0" err="1" smtClean="0"/>
-              <a:t>sellShareToTrader</a:t>
-            </a:r>
-            <a:r>
-              <a:rPr lang="de-DE" sz="2800" dirty="0" smtClean="0"/>
-              <a:t>(Share)</a:t>
+              <a:rPr lang="de-DE" sz="2800" dirty="0"/>
+              <a:t>Money::sellShareToTrader(Money,shares)</a:t>
             </a:r>
             <a:endParaRPr lang="de-DE" sz="2800" dirty="0"/>
           </a:p>
@@ -7067,7 +7127,7 @@
         <p:spPr>
           <a:xfrm>
             <a:off x="2593786" y="5613969"/>
-            <a:ext cx="6526744" cy="1384995"/>
+            <a:ext cx="8153810" cy="1815882"/>
           </a:xfrm>
           <a:prstGeom prst="rect">
             <a:avLst/>
@@ -7090,8 +7150,8 @@
               <a:buChar char="§"/>
             </a:pPr>
             <a:r>
-              <a:rPr lang="de-DE" sz="2800" dirty="0" err="1"/>
-              <a:t>runStrategy</a:t>
+              <a:rPr lang="de-DE" sz="2800" dirty="0" smtClean="0"/>
+              <a:t>order::runStrategy</a:t>
             </a:r>
             <a:r>
               <a:rPr lang="de-DE" sz="2800" dirty="0"/>
@@ -7112,13 +7172,10 @@
               <a:t>Share::</a:t>
             </a:r>
             <a:r>
-              <a:rPr lang="de-DE" sz="2800" dirty="0" err="1" smtClean="0"/>
-              <a:t>buyShareFromTrader</a:t>
-            </a:r>
-            <a:r>
               <a:rPr lang="de-DE" sz="2800" dirty="0" smtClean="0"/>
-              <a:t>(Money)</a:t>
-            </a:r>
+              <a:t>buyShareFromTrader (Money,shares)</a:t>
+            </a:r>
+            <a:endParaRPr lang="de-DE" sz="2800" dirty="0" smtClean="0"/>
           </a:p>
           <a:p>
             <a:pPr marL="712693" indent="-712693">
@@ -7130,12 +7187,26 @@
               <a:t>Money::</a:t>
             </a:r>
             <a:r>
-              <a:rPr lang="de-DE" sz="2800" dirty="0" err="1" smtClean="0"/>
-              <a:t>sellShareToTrader</a:t>
+              <a:rPr lang="de-DE" sz="2800" dirty="0"/>
+              <a:t>sellShareToTrader(Money,shares</a:t>
             </a:r>
             <a:r>
               <a:rPr lang="de-DE" sz="2800" dirty="0" smtClean="0"/>
-              <a:t>(Share)</a:t>
+              <a:t>)</a:t>
+            </a:r>
+          </a:p>
+          <a:p>
+            <a:pPr marL="712693" indent="-712693">
+              <a:buFont typeface="Wingdings" charset="2"/>
+              <a:buChar char="§"/>
+            </a:pPr>
+            <a:r>
+              <a:rPr lang="en-GB" sz="2800" dirty="0" err="1"/>
+              <a:t>sendFinalOrderToMarket</a:t>
+            </a:r>
+            <a:r>
+              <a:rPr lang="en-GB" sz="2800" dirty="0"/>
+              <a:t>()</a:t>
             </a:r>
             <a:endParaRPr lang="de-DE" sz="2800" dirty="0"/>
           </a:p>

</xml_diff>